<commit_message>
Presentation with liam part final version1
</commit_message>
<xml_diff>
--- a/Liam_resarch/Refactoring HTMSerializer_with_liam_part.pptx
+++ b/Liam_resarch/Refactoring HTMSerializer_with_liam_part.pptx
@@ -12373,7 +12373,7 @@
         <p:spPr>
           <a:xfrm>
             <a:off x="9749643" y="4572000"/>
-            <a:ext cx="1864426" cy="923330"/>
+            <a:ext cx="1864426" cy="1200329"/>
           </a:xfrm>
           <a:prstGeom prst="rect">
             <a:avLst/>
@@ -12418,6 +12418,17 @@
               <a:rPr lang="es-ES" dirty="0"/>
               <a:t>María Sanz Piña</a:t>
             </a:r>
+          </a:p>
+          <a:p>
+            <a:r>
+              <a:rPr lang="es-ES" dirty="0"/>
+              <a:t>Liam </a:t>
+            </a:r>
+            <a:r>
+              <a:rPr lang="es-ES"/>
+              <a:t>Hosier</a:t>
+            </a:r>
+            <a:endParaRPr lang="es-ES" dirty="0"/>
           </a:p>
         </p:txBody>
       </p:sp>

</xml_diff>